<commit_message>
as/ updating slide deck
</commit_message>
<xml_diff>
--- a/docs/Sliding Puzzle.pptx
+++ b/docs/Sliding Puzzle.pptx
@@ -6910,7 +6910,7 @@
       </p:sp>
       <p:pic>
         <p:nvPicPr>
-          <p:cNvPr id="5" name="Content Placeholder 4"/>
+          <p:cNvPr id="7" name="Content Placeholder 6"/>
           <p:cNvPicPr>
             <a:picLocks noGrp="1" noChangeAspect="1"/>
           </p:cNvPicPr>
@@ -6932,8 +6932,8 @@
         </p:blipFill>
         <p:spPr>
           <a:xfrm>
-            <a:off x="677863" y="1468193"/>
-            <a:ext cx="10646960" cy="4997002"/>
+            <a:off x="677862" y="1360868"/>
+            <a:ext cx="10007309" cy="4881093"/>
           </a:xfrm>
         </p:spPr>
       </p:pic>

</xml_diff>